<commit_message>
pc and oops basics
</commit_message>
<xml_diff>
--- a/documents/java-setup.pptx
+++ b/documents/java-setup.pptx
@@ -310,6 +310,7 @@
           <a:p>
             <a:fld id="{94772C69-F78E-478C-8424-CDD80BCA9603}" type="datetimeFigureOut">
               <a:rPr lang="en-US" smtClean="0"/>
+              <a:pPr/>
               <a:t>12/20/2022</a:t>
             </a:fld>
             <a:endParaRPr lang="en-US"/>
@@ -352,6 +353,7 @@
           <a:p>
             <a:fld id="{20E86DAF-725E-4664-A884-87F40A82C37B}" type="slidenum">
               <a:rPr lang="en-US" smtClean="0"/>
+              <a:pPr/>
               <a:t>‹#›</a:t>
             </a:fld>
             <a:endParaRPr lang="en-US"/>
@@ -475,6 +477,7 @@
           <a:p>
             <a:fld id="{94772C69-F78E-478C-8424-CDD80BCA9603}" type="datetimeFigureOut">
               <a:rPr lang="en-US" smtClean="0"/>
+              <a:pPr/>
               <a:t>12/20/2022</a:t>
             </a:fld>
             <a:endParaRPr lang="en-US"/>
@@ -517,6 +520,7 @@
           <a:p>
             <a:fld id="{20E86DAF-725E-4664-A884-87F40A82C37B}" type="slidenum">
               <a:rPr lang="en-US" smtClean="0"/>
+              <a:pPr/>
               <a:t>‹#›</a:t>
             </a:fld>
             <a:endParaRPr lang="en-US"/>
@@ -650,6 +654,7 @@
           <a:p>
             <a:fld id="{94772C69-F78E-478C-8424-CDD80BCA9603}" type="datetimeFigureOut">
               <a:rPr lang="en-US" smtClean="0"/>
+              <a:pPr/>
               <a:t>12/20/2022</a:t>
             </a:fld>
             <a:endParaRPr lang="en-US"/>
@@ -692,6 +697,7 @@
           <a:p>
             <a:fld id="{20E86DAF-725E-4664-A884-87F40A82C37B}" type="slidenum">
               <a:rPr lang="en-US" smtClean="0"/>
+              <a:pPr/>
               <a:t>‹#›</a:t>
             </a:fld>
             <a:endParaRPr lang="en-US"/>
@@ -815,6 +821,7 @@
           <a:p>
             <a:fld id="{94772C69-F78E-478C-8424-CDD80BCA9603}" type="datetimeFigureOut">
               <a:rPr lang="en-US" smtClean="0"/>
+              <a:pPr/>
               <a:t>12/20/2022</a:t>
             </a:fld>
             <a:endParaRPr lang="en-US"/>
@@ -857,6 +864,7 @@
           <a:p>
             <a:fld id="{20E86DAF-725E-4664-A884-87F40A82C37B}" type="slidenum">
               <a:rPr lang="en-US" smtClean="0"/>
+              <a:pPr/>
               <a:t>‹#›</a:t>
             </a:fld>
             <a:endParaRPr lang="en-US"/>
@@ -1056,6 +1064,7 @@
           <a:p>
             <a:fld id="{94772C69-F78E-478C-8424-CDD80BCA9603}" type="datetimeFigureOut">
               <a:rPr lang="en-US" smtClean="0"/>
+              <a:pPr/>
               <a:t>12/20/2022</a:t>
             </a:fld>
             <a:endParaRPr lang="en-US"/>
@@ -1098,6 +1107,7 @@
           <a:p>
             <a:fld id="{20E86DAF-725E-4664-A884-87F40A82C37B}" type="slidenum">
               <a:rPr lang="en-US" smtClean="0"/>
+              <a:pPr/>
               <a:t>‹#›</a:t>
             </a:fld>
             <a:endParaRPr lang="en-US"/>
@@ -1339,6 +1349,7 @@
           <a:p>
             <a:fld id="{94772C69-F78E-478C-8424-CDD80BCA9603}" type="datetimeFigureOut">
               <a:rPr lang="en-US" smtClean="0"/>
+              <a:pPr/>
               <a:t>12/20/2022</a:t>
             </a:fld>
             <a:endParaRPr lang="en-US"/>
@@ -1381,6 +1392,7 @@
           <a:p>
             <a:fld id="{20E86DAF-725E-4664-A884-87F40A82C37B}" type="slidenum">
               <a:rPr lang="en-US" smtClean="0"/>
+              <a:pPr/>
               <a:t>‹#›</a:t>
             </a:fld>
             <a:endParaRPr lang="en-US"/>
@@ -1756,6 +1768,7 @@
           <a:p>
             <a:fld id="{94772C69-F78E-478C-8424-CDD80BCA9603}" type="datetimeFigureOut">
               <a:rPr lang="en-US" smtClean="0"/>
+              <a:pPr/>
               <a:t>12/20/2022</a:t>
             </a:fld>
             <a:endParaRPr lang="en-US"/>
@@ -1798,6 +1811,7 @@
           <a:p>
             <a:fld id="{20E86DAF-725E-4664-A884-87F40A82C37B}" type="slidenum">
               <a:rPr lang="en-US" smtClean="0"/>
+              <a:pPr/>
               <a:t>‹#›</a:t>
             </a:fld>
             <a:endParaRPr lang="en-US"/>
@@ -1869,6 +1883,7 @@
           <a:p>
             <a:fld id="{94772C69-F78E-478C-8424-CDD80BCA9603}" type="datetimeFigureOut">
               <a:rPr lang="en-US" smtClean="0"/>
+              <a:pPr/>
               <a:t>12/20/2022</a:t>
             </a:fld>
             <a:endParaRPr lang="en-US"/>
@@ -1911,6 +1926,7 @@
           <a:p>
             <a:fld id="{20E86DAF-725E-4664-A884-87F40A82C37B}" type="slidenum">
               <a:rPr lang="en-US" smtClean="0"/>
+              <a:pPr/>
               <a:t>‹#›</a:t>
             </a:fld>
             <a:endParaRPr lang="en-US"/>
@@ -1959,6 +1975,7 @@
           <a:p>
             <a:fld id="{94772C69-F78E-478C-8424-CDD80BCA9603}" type="datetimeFigureOut">
               <a:rPr lang="en-US" smtClean="0"/>
+              <a:pPr/>
               <a:t>12/20/2022</a:t>
             </a:fld>
             <a:endParaRPr lang="en-US"/>
@@ -2001,6 +2018,7 @@
           <a:p>
             <a:fld id="{20E86DAF-725E-4664-A884-87F40A82C37B}" type="slidenum">
               <a:rPr lang="en-US" smtClean="0"/>
+              <a:pPr/>
               <a:t>‹#›</a:t>
             </a:fld>
             <a:endParaRPr lang="en-US"/>
@@ -2231,6 +2249,7 @@
           <a:p>
             <a:fld id="{94772C69-F78E-478C-8424-CDD80BCA9603}" type="datetimeFigureOut">
               <a:rPr lang="en-US" smtClean="0"/>
+              <a:pPr/>
               <a:t>12/20/2022</a:t>
             </a:fld>
             <a:endParaRPr lang="en-US"/>
@@ -2273,6 +2292,7 @@
           <a:p>
             <a:fld id="{20E86DAF-725E-4664-A884-87F40A82C37B}" type="slidenum">
               <a:rPr lang="en-US" smtClean="0"/>
+              <a:pPr/>
               <a:t>‹#›</a:t>
             </a:fld>
             <a:endParaRPr lang="en-US"/>
@@ -2479,6 +2499,7 @@
           <a:p>
             <a:fld id="{94772C69-F78E-478C-8424-CDD80BCA9603}" type="datetimeFigureOut">
               <a:rPr lang="en-US" smtClean="0"/>
+              <a:pPr/>
               <a:t>12/20/2022</a:t>
             </a:fld>
             <a:endParaRPr lang="en-US"/>
@@ -2521,6 +2542,7 @@
           <a:p>
             <a:fld id="{20E86DAF-725E-4664-A884-87F40A82C37B}" type="slidenum">
               <a:rPr lang="en-US" smtClean="0"/>
+              <a:pPr/>
               <a:t>‹#›</a:t>
             </a:fld>
             <a:endParaRPr lang="en-US"/>
@@ -2687,6 +2709,7 @@
           <a:p>
             <a:fld id="{94772C69-F78E-478C-8424-CDD80BCA9603}" type="datetimeFigureOut">
               <a:rPr lang="en-US" smtClean="0"/>
+              <a:pPr/>
               <a:t>12/20/2022</a:t>
             </a:fld>
             <a:endParaRPr lang="en-US"/>
@@ -2765,6 +2788,7 @@
           <a:p>
             <a:fld id="{20E86DAF-725E-4664-A884-87F40A82C37B}" type="slidenum">
               <a:rPr lang="en-US" smtClean="0"/>
+              <a:pPr/>
               <a:t>‹#›</a:t>
             </a:fld>
             <a:endParaRPr lang="en-US"/>
@@ -3354,7 +3378,6 @@
               <a:rPr lang="en-US" dirty="0" smtClean="0"/>
               <a:t>Click add</a:t>
             </a:r>
-            <a:endParaRPr lang="en-US" dirty="0" smtClean="0"/>
           </a:p>
         </p:txBody>
       </p:sp>
@@ -3485,7 +3508,6 @@
               <a:rPr lang="en-US" dirty="0" smtClean="0"/>
               <a:t>Click next</a:t>
             </a:r>
-            <a:endParaRPr lang="en-US" dirty="0" smtClean="0"/>
           </a:p>
         </p:txBody>
       </p:sp>
@@ -3556,7 +3578,6 @@
               <a:rPr lang="en-US" dirty="0" smtClean="0"/>
               <a:t>Click select folder</a:t>
             </a:r>
-            <a:endParaRPr lang="en-US" dirty="0" smtClean="0"/>
           </a:p>
         </p:txBody>
       </p:sp>
@@ -3674,7 +3695,6 @@
               <a:rPr lang="en-US" dirty="0" smtClean="0"/>
               <a:t>Click finish</a:t>
             </a:r>
-            <a:endParaRPr lang="en-US" dirty="0" smtClean="0"/>
           </a:p>
         </p:txBody>
       </p:sp>
@@ -3885,7 +3905,6 @@
               <a:rPr lang="en-US" dirty="0" smtClean="0"/>
               <a:t>Click compiler on the left</a:t>
             </a:r>
-            <a:endParaRPr lang="en-US" dirty="0" smtClean="0"/>
           </a:p>
         </p:txBody>
       </p:sp>
@@ -3940,7 +3959,6 @@
               <a:rPr lang="en-US" dirty="0" smtClean="0"/>
               <a:t>Click apply and close</a:t>
             </a:r>
-            <a:endParaRPr lang="en-US" dirty="0" smtClean="0"/>
           </a:p>
         </p:txBody>
       </p:sp>
@@ -4274,9 +4292,59 @@
           </a:p>
         </p:txBody>
       </p:sp>
+      <p:sp>
+        <p:nvSpPr>
+          <p:cNvPr id="5" name="TextBox 4"/>
+          <p:cNvSpPr txBox="1"/>
+          <p:nvPr/>
+        </p:nvSpPr>
+        <p:spPr>
+          <a:xfrm>
+            <a:off x="1447800" y="2286000"/>
+            <a:ext cx="3636445" cy="369332"/>
+          </a:xfrm>
+          <a:prstGeom prst="rect">
+            <a:avLst/>
+          </a:prstGeom>
+          <a:noFill/>
+        </p:spPr>
+        <p:txBody>
+          <a:bodyPr wrap="none" rtlCol="0">
+            <a:spAutoFit/>
+          </a:bodyPr>
+          <a:lstStyle/>
+          <a:p>
+            <a:r>
+              <a:rPr lang="en-US" dirty="0" smtClean="0"/>
+              <a:t>Type </a:t>
+            </a:r>
+            <a:r>
+              <a:rPr lang="en-US" dirty="0" err="1" smtClean="0"/>
+              <a:t>git</a:t>
+            </a:r>
+            <a:r>
+              <a:rPr lang="en-US" dirty="0" smtClean="0"/>
+              <a:t> repo &gt; select </a:t>
+            </a:r>
+            <a:r>
+              <a:rPr lang="en-US" dirty="0" err="1" smtClean="0"/>
+              <a:t>git</a:t>
+            </a:r>
+            <a:r>
+              <a:rPr lang="en-US" dirty="0" smtClean="0"/>
+              <a:t> </a:t>
+            </a:r>
+            <a:r>
+              <a:rPr lang="en-US" dirty="0" smtClean="0"/>
+              <a:t>repositories</a:t>
+            </a:r>
+            <a:endParaRPr lang="en-US" dirty="0"/>
+          </a:p>
+        </p:txBody>
+      </p:sp>
       <p:pic>
         <p:nvPicPr>
-          <p:cNvPr id="7170" name="Picture 2"/>
+          <p:cNvPr id="7171" name="Picture 3"/>
           <p:cNvPicPr>
             <a:picLocks noChangeAspect="1" noChangeArrowheads="1"/>
           </p:cNvPicPr>
@@ -4291,8 +4359,8 @@
         </p:blipFill>
         <p:spPr bwMode="auto">
           <a:xfrm>
-            <a:off x="533400" y="2590800"/>
-            <a:ext cx="4562475" cy="1552575"/>
+            <a:off x="381000" y="4679879"/>
+            <a:ext cx="3657600" cy="2178121"/>
           </a:xfrm>
           <a:prstGeom prst="rect">
             <a:avLst/>
@@ -4308,14 +4376,14 @@
       </p:pic>
       <p:sp>
         <p:nvSpPr>
-          <p:cNvPr id="5" name="TextBox 4"/>
+          <p:cNvPr id="7" name="TextBox 6"/>
           <p:cNvSpPr txBox="1"/>
           <p:nvPr/>
         </p:nvSpPr>
         <p:spPr>
           <a:xfrm>
-            <a:off x="1447800" y="2286000"/>
-            <a:ext cx="3483711" cy="369332"/>
+            <a:off x="4495800" y="5486400"/>
+            <a:ext cx="2166683" cy="646331"/>
           </a:xfrm>
           <a:prstGeom prst="rect">
             <a:avLst/>
@@ -4330,7 +4398,7 @@
           <a:p>
             <a:r>
               <a:rPr lang="en-US" dirty="0" smtClean="0"/>
-              <a:t>Type </a:t>
+              <a:t>Click green </a:t>
             </a:r>
             <a:r>
               <a:rPr lang="en-US" dirty="0" err="1" smtClean="0"/>
@@ -4338,7 +4406,13 @@
             </a:r>
             <a:r>
               <a:rPr lang="en-US" dirty="0" smtClean="0"/>
-              <a:t> repo &gt; select </a:t>
+              <a:t> icon</a:t>
+            </a:r>
+          </a:p>
+          <a:p>
+            <a:r>
+              <a:rPr lang="en-US" dirty="0" smtClean="0"/>
+              <a:t>(Clone </a:t>
             </a:r>
             <a:r>
               <a:rPr lang="en-US" dirty="0" err="1" smtClean="0"/>
@@ -4346,7 +4420,7 @@
             </a:r>
             <a:r>
               <a:rPr lang="en-US" dirty="0" smtClean="0"/>
-              <a:t> repository</a:t>
+              <a:t> repository)</a:t>
             </a:r>
             <a:endParaRPr lang="en-US" dirty="0"/>
           </a:p>
@@ -4354,7 +4428,7 @@
       </p:sp>
       <p:pic>
         <p:nvPicPr>
-          <p:cNvPr id="7171" name="Picture 3"/>
+          <p:cNvPr id="2050" name="Picture 2"/>
           <p:cNvPicPr>
             <a:picLocks noChangeAspect="1" noChangeArrowheads="1"/>
           </p:cNvPicPr>
@@ -4369,8 +4443,8 @@
         </p:blipFill>
         <p:spPr bwMode="auto">
           <a:xfrm>
-            <a:off x="381000" y="4679879"/>
-            <a:ext cx="3657600" cy="2178121"/>
+            <a:off x="609600" y="2743200"/>
+            <a:ext cx="4438650" cy="1533525"/>
           </a:xfrm>
           <a:prstGeom prst="rect">
             <a:avLst/>
@@ -4384,58 +4458,6 @@
           </a:ln>
         </p:spPr>
       </p:pic>
-      <p:sp>
-        <p:nvSpPr>
-          <p:cNvPr id="7" name="TextBox 6"/>
-          <p:cNvSpPr txBox="1"/>
-          <p:nvPr/>
-        </p:nvSpPr>
-        <p:spPr>
-          <a:xfrm>
-            <a:off x="4495800" y="5486400"/>
-            <a:ext cx="2166683" cy="646331"/>
-          </a:xfrm>
-          <a:prstGeom prst="rect">
-            <a:avLst/>
-          </a:prstGeom>
-          <a:noFill/>
-        </p:spPr>
-        <p:txBody>
-          <a:bodyPr wrap="none" rtlCol="0">
-            <a:spAutoFit/>
-          </a:bodyPr>
-          <a:lstStyle/>
-          <a:p>
-            <a:r>
-              <a:rPr lang="en-US" dirty="0" smtClean="0"/>
-              <a:t>Click green </a:t>
-            </a:r>
-            <a:r>
-              <a:rPr lang="en-US" dirty="0" err="1" smtClean="0"/>
-              <a:t>git</a:t>
-            </a:r>
-            <a:r>
-              <a:rPr lang="en-US" dirty="0" smtClean="0"/>
-              <a:t> icon</a:t>
-            </a:r>
-          </a:p>
-          <a:p>
-            <a:r>
-              <a:rPr lang="en-US" dirty="0" smtClean="0"/>
-              <a:t>(Clone </a:t>
-            </a:r>
-            <a:r>
-              <a:rPr lang="en-US" dirty="0" err="1" smtClean="0"/>
-              <a:t>git</a:t>
-            </a:r>
-            <a:r>
-              <a:rPr lang="en-US" dirty="0" smtClean="0"/>
-              <a:t> repository)</a:t>
-            </a:r>
-            <a:endParaRPr lang="en-US" dirty="0"/>
-          </a:p>
-        </p:txBody>
-      </p:sp>
     </p:spTree>
   </p:cSld>
   <p:clrMapOvr>
@@ -5508,8 +5530,8 @@
         </p:nvSpPr>
         <p:spPr bwMode="auto">
           <a:xfrm>
-            <a:off x="1" y="98794"/>
-            <a:ext cx="9144000" cy="1631216"/>
+            <a:off x="1" y="227112"/>
+            <a:ext cx="9144000" cy="2554545"/>
           </a:xfrm>
           <a:prstGeom prst="rect">
             <a:avLst/>
@@ -5635,7 +5657,139 @@
                 <a:ea typeface="Calibri" pitchFamily="34" charset="0"/>
                 <a:cs typeface="Times New Roman" pitchFamily="18" charset="0"/>
               </a:rPr>
-              <a:t>Install java (use default values from java installer and complete installation (click next </a:t>
+              <a:t>Download the </a:t>
+            </a:r>
+            <a:r>
+              <a:rPr kumimoji="0" lang="en-US" sz="2000" b="0" i="0" u="none" strike="noStrike" cap="none" normalizeH="0" baseline="0" dirty="0" err="1" smtClean="0">
+                <a:ln>
+                  <a:noFill/>
+                </a:ln>
+                <a:solidFill>
+                  <a:schemeClr val="tx1"/>
+                </a:solidFill>
+                <a:effectLst/>
+                <a:latin typeface="Calibri" pitchFamily="34" charset="0"/>
+                <a:ea typeface="Calibri" pitchFamily="34" charset="0"/>
+                <a:cs typeface="Times New Roman" pitchFamily="18" charset="0"/>
+              </a:rPr>
+              <a:t>jdk</a:t>
+            </a:r>
+            <a:r>
+              <a:rPr kumimoji="0" lang="en-US" sz="2000" b="0" i="0" u="none" strike="noStrike" cap="none" normalizeH="0" baseline="0" dirty="0" smtClean="0">
+                <a:ln>
+                  <a:noFill/>
+                </a:ln>
+                <a:solidFill>
+                  <a:schemeClr val="tx1"/>
+                </a:solidFill>
+                <a:effectLst/>
+                <a:latin typeface="Calibri" pitchFamily="34" charset="0"/>
+                <a:ea typeface="Calibri" pitchFamily="34" charset="0"/>
+                <a:cs typeface="Times New Roman" pitchFamily="18" charset="0"/>
+              </a:rPr>
+              <a:t> after repeating steps from previous slide</a:t>
+            </a:r>
+          </a:p>
+          <a:p>
+            <a:pPr marL="0" marR="0" lvl="0" indent="0" algn="l" defTabSz="914400" rtl="0" eaLnBrk="0" fontAlgn="base" latinLnBrk="0" hangingPunct="0">
+              <a:lnSpc>
+                <a:spcPct val="100000"/>
+              </a:lnSpc>
+              <a:spcBef>
+                <a:spcPct val="0"/>
+              </a:spcBef>
+              <a:spcAft>
+                <a:spcPct val="0"/>
+              </a:spcAft>
+              <a:buClrTx/>
+              <a:buSzTx/>
+              <a:buFontTx/>
+              <a:buChar char="•"/>
+              <a:tabLst/>
+            </a:pPr>
+            <a:r>
+              <a:rPr lang="en-US" sz="2000" dirty="0" smtClean="0">
+                <a:latin typeface="Calibri" pitchFamily="34" charset="0"/>
+                <a:ea typeface="Calibri" pitchFamily="34" charset="0"/>
+                <a:cs typeface="Times New Roman" pitchFamily="18" charset="0"/>
+              </a:rPr>
+              <a:t>Go to download folders and double click the </a:t>
+            </a:r>
+            <a:r>
+              <a:rPr lang="en-US" sz="2000" dirty="0" err="1" smtClean="0">
+                <a:latin typeface="Calibri" pitchFamily="34" charset="0"/>
+                <a:ea typeface="Calibri" pitchFamily="34" charset="0"/>
+                <a:cs typeface="Times New Roman" pitchFamily="18" charset="0"/>
+              </a:rPr>
+              <a:t>jdk</a:t>
+            </a:r>
+            <a:r>
+              <a:rPr lang="en-US" sz="2000" dirty="0" smtClean="0">
+                <a:latin typeface="Calibri" pitchFamily="34" charset="0"/>
+                <a:ea typeface="Calibri" pitchFamily="34" charset="0"/>
+                <a:cs typeface="Times New Roman" pitchFamily="18" charset="0"/>
+              </a:rPr>
+              <a:t> installer file</a:t>
+            </a:r>
+            <a:endParaRPr kumimoji="0" lang="en-US" sz="2000" b="0" i="0" u="none" strike="noStrike" cap="none" normalizeH="0" baseline="0" dirty="0" smtClean="0">
+              <a:ln>
+                <a:noFill/>
+              </a:ln>
+              <a:solidFill>
+                <a:schemeClr val="tx1"/>
+              </a:solidFill>
+              <a:effectLst/>
+              <a:latin typeface="Calibri" pitchFamily="34" charset="0"/>
+              <a:ea typeface="Calibri" pitchFamily="34" charset="0"/>
+              <a:cs typeface="Times New Roman" pitchFamily="18" charset="0"/>
+            </a:endParaRPr>
+          </a:p>
+          <a:p>
+            <a:pPr marL="0" marR="0" lvl="0" indent="0" algn="l" defTabSz="914400" rtl="0" eaLnBrk="0" fontAlgn="base" latinLnBrk="0" hangingPunct="0">
+              <a:lnSpc>
+                <a:spcPct val="100000"/>
+              </a:lnSpc>
+              <a:spcBef>
+                <a:spcPct val="0"/>
+              </a:spcBef>
+              <a:spcAft>
+                <a:spcPct val="0"/>
+              </a:spcAft>
+              <a:buClrTx/>
+              <a:buSzTx/>
+              <a:buFontTx/>
+              <a:buChar char="•"/>
+              <a:tabLst/>
+            </a:pPr>
+            <a:r>
+              <a:rPr kumimoji="0" lang="en-US" sz="2000" b="0" i="0" u="none" strike="noStrike" cap="none" normalizeH="0" baseline="0" dirty="0" smtClean="0">
+                <a:ln>
+                  <a:noFill/>
+                </a:ln>
+                <a:solidFill>
+                  <a:schemeClr val="tx1"/>
+                </a:solidFill>
+                <a:effectLst/>
+                <a:latin typeface="Calibri" pitchFamily="34" charset="0"/>
+                <a:ea typeface="Calibri" pitchFamily="34" charset="0"/>
+                <a:cs typeface="Times New Roman" pitchFamily="18" charset="0"/>
+              </a:rPr>
+              <a:t>Install </a:t>
+            </a:r>
+            <a:r>
+              <a:rPr kumimoji="0" lang="en-US" sz="2000" b="0" i="0" u="none" strike="noStrike" cap="none" normalizeH="0" baseline="0" dirty="0" smtClean="0">
+                <a:ln>
+                  <a:noFill/>
+                </a:ln>
+                <a:solidFill>
+                  <a:schemeClr val="tx1"/>
+                </a:solidFill>
+                <a:effectLst/>
+                <a:latin typeface="Calibri" pitchFamily="34" charset="0"/>
+                <a:ea typeface="Calibri" pitchFamily="34" charset="0"/>
+                <a:cs typeface="Times New Roman" pitchFamily="18" charset="0"/>
+              </a:rPr>
+              <a:t>java (use default values from java installer and complete installation (click next </a:t>
             </a:r>
             <a:r>
               <a:rPr kumimoji="0" lang="en-US" sz="2000" b="0" i="0" u="none" strike="noStrike" cap="none" normalizeH="0" baseline="0" dirty="0" err="1" smtClean="0">
@@ -5709,14 +5863,64 @@
                 <a:ea typeface="Calibri" pitchFamily="34" charset="0"/>
                 <a:cs typeface="Times New Roman" pitchFamily="18" charset="0"/>
               </a:rPr>
-              <a:t>Check in Program Files for folder C:\Program Files\Java</a:t>
-            </a:r>
-            <a:endParaRPr kumimoji="0" lang="en-US" sz="2000" b="0" i="0" u="none" strike="noStrike" cap="none" normalizeH="0" baseline="0" dirty="0" smtClean="0">
+              <a:t>Check in Program Files for folder C:\Program </a:t>
+            </a:r>
+            <a:r>
+              <a:rPr kumimoji="0" lang="en-US" sz="2000" b="0" i="0" u="none" strike="noStrike" cap="none" normalizeH="0" baseline="0" dirty="0" smtClean="0">
+                <a:ln>
+                  <a:noFill/>
+                </a:ln>
+                <a:solidFill>
+                  <a:schemeClr val="tx1"/>
+                </a:solidFill>
+                <a:effectLst/>
+                <a:latin typeface="Calibri" pitchFamily="34" charset="0"/>
+                <a:ea typeface="Calibri" pitchFamily="34" charset="0"/>
+                <a:cs typeface="Times New Roman" pitchFamily="18" charset="0"/>
+              </a:rPr>
+              <a:t>Files\Java</a:t>
+            </a:r>
+          </a:p>
+          <a:p>
+            <a:pPr marL="0" marR="0" lvl="0" indent="0" algn="l" defTabSz="914400" rtl="0" eaLnBrk="0" fontAlgn="base" latinLnBrk="0" hangingPunct="0">
+              <a:lnSpc>
+                <a:spcPct val="100000"/>
+              </a:lnSpc>
+              <a:spcBef>
+                <a:spcPct val="0"/>
+              </a:spcBef>
+              <a:spcAft>
+                <a:spcPct val="0"/>
+              </a:spcAft>
+              <a:buClrTx/>
+              <a:buSzTx/>
+              <a:buFontTx/>
+              <a:buChar char="•"/>
+              <a:tabLst/>
+            </a:pPr>
+            <a:r>
+              <a:rPr lang="en-US" sz="2000" dirty="0" smtClean="0">
+                <a:latin typeface="Calibri" pitchFamily="34" charset="0"/>
+                <a:cs typeface="Times New Roman" pitchFamily="18" charset="0"/>
+              </a:rPr>
+              <a:t>Ensure the java folder contains </a:t>
+            </a:r>
+            <a:r>
+              <a:rPr lang="en-US" sz="2000" b="1" dirty="0" smtClean="0">
+                <a:solidFill>
+                  <a:srgbClr val="FF0000"/>
+                </a:solidFill>
+                <a:latin typeface="Calibri" pitchFamily="34" charset="0"/>
+                <a:cs typeface="Times New Roman" pitchFamily="18" charset="0"/>
+              </a:rPr>
+              <a:t>“JDK”</a:t>
+            </a:r>
+            <a:endParaRPr kumimoji="0" lang="en-US" sz="2000" b="1" i="0" u="none" strike="noStrike" cap="none" normalizeH="0" baseline="0" dirty="0" smtClean="0">
               <a:ln>
                 <a:noFill/>
               </a:ln>
               <a:solidFill>
-                <a:schemeClr val="tx1"/>
+                <a:srgbClr val="FF0000"/>
               </a:solidFill>
               <a:effectLst/>
               <a:latin typeface="Arial" pitchFamily="34" charset="0"/>
@@ -5740,7 +5944,7 @@
         </p:blipFill>
         <p:spPr bwMode="auto">
           <a:xfrm>
-            <a:off x="1447800" y="2057400"/>
+            <a:off x="228600" y="2819400"/>
             <a:ext cx="3613150" cy="1193800"/>
           </a:xfrm>
           <a:prstGeom prst="rect">
@@ -5765,7 +5969,7 @@
         </p:nvSpPr>
         <p:spPr bwMode="auto">
           <a:xfrm>
-            <a:off x="304800" y="3496271"/>
+            <a:off x="304800" y="4554141"/>
             <a:ext cx="7543800" cy="1846659"/>
           </a:xfrm>
           <a:prstGeom prst="rect">
@@ -6237,6 +6441,38 @@
           </a:p>
         </p:txBody>
       </p:sp>
+      <p:pic>
+        <p:nvPicPr>
+          <p:cNvPr id="1026" name="Picture 2"/>
+          <p:cNvPicPr>
+            <a:picLocks noChangeAspect="1" noChangeArrowheads="1"/>
+          </p:cNvPicPr>
+          <p:nvPr/>
+        </p:nvPicPr>
+        <p:blipFill>
+          <a:blip r:embed="rId3" cstate="print"/>
+          <a:srcRect/>
+          <a:stretch>
+            <a:fillRect/>
+          </a:stretch>
+        </p:blipFill>
+        <p:spPr bwMode="auto">
+          <a:xfrm>
+            <a:off x="4419600" y="2590800"/>
+            <a:ext cx="3676650" cy="1495425"/>
+          </a:xfrm>
+          <a:prstGeom prst="rect">
+            <a:avLst/>
+          </a:prstGeom>
+          <a:noFill/>
+          <a:ln w="9525">
+            <a:noFill/>
+            <a:miter lim="800000"/>
+            <a:headEnd/>
+            <a:tailEnd/>
+          </a:ln>
+        </p:spPr>
+      </p:pic>
     </p:spTree>
   </p:cSld>
   <p:clrMapOvr>
@@ -7467,18 +7703,6 @@
               </a:rPr>
               <a:t>Enter location where you would like to keep java projects</a:t>
             </a:r>
-            <a:endParaRPr kumimoji="0" lang="en-US" sz="2000" b="0" i="0" u="none" strike="noStrike" cap="none" normalizeH="0" baseline="0" dirty="0" smtClean="0">
-              <a:ln>
-                <a:noFill/>
-              </a:ln>
-              <a:solidFill>
-                <a:schemeClr val="tx1"/>
-              </a:solidFill>
-              <a:effectLst/>
-              <a:latin typeface="Calibri" pitchFamily="34" charset="0"/>
-              <a:ea typeface="Calibri" pitchFamily="34" charset="0"/>
-              <a:cs typeface="Times New Roman" pitchFamily="18" charset="0"/>
-            </a:endParaRPr>
           </a:p>
         </p:txBody>
       </p:sp>
@@ -7563,7 +7787,6 @@
               <a:rPr lang="en-US" dirty="0" smtClean="0"/>
               <a:t>Select new &gt; java project</a:t>
             </a:r>
-            <a:endParaRPr lang="en-US" dirty="0" smtClean="0"/>
           </a:p>
         </p:txBody>
       </p:sp>

</xml_diff>